<commit_message>
Added violin and density to day1
</commit_message>
<xml_diff>
--- a/slides/day1_descriptive_and_summary.pptx
+++ b/slides/day1_descriptive_and_summary.pptx
@@ -5,7 +5,7 @@
     <p:sldMasterId id="2147484099" r:id="rId1"/>
   </p:sldMasterIdLst>
   <p:notesMasterIdLst>
-    <p:notesMasterId r:id="rId36"/>
+    <p:notesMasterId r:id="rId38"/>
   </p:notesMasterIdLst>
   <p:sldIdLst>
     <p:sldId id="256" r:id="rId2"/>
@@ -34,14 +34,16 @@
     <p:sldId id="262" r:id="rId25"/>
     <p:sldId id="272" r:id="rId26"/>
     <p:sldId id="300" r:id="rId27"/>
-    <p:sldId id="290" r:id="rId28"/>
-    <p:sldId id="292" r:id="rId29"/>
-    <p:sldId id="291" r:id="rId30"/>
-    <p:sldId id="293" r:id="rId31"/>
-    <p:sldId id="295" r:id="rId32"/>
-    <p:sldId id="294" r:id="rId33"/>
-    <p:sldId id="297" r:id="rId34"/>
-    <p:sldId id="296" r:id="rId35"/>
+    <p:sldId id="301" r:id="rId28"/>
+    <p:sldId id="290" r:id="rId29"/>
+    <p:sldId id="292" r:id="rId30"/>
+    <p:sldId id="291" r:id="rId31"/>
+    <p:sldId id="302" r:id="rId32"/>
+    <p:sldId id="293" r:id="rId33"/>
+    <p:sldId id="295" r:id="rId34"/>
+    <p:sldId id="294" r:id="rId35"/>
+    <p:sldId id="297" r:id="rId36"/>
+    <p:sldId id="296" r:id="rId37"/>
   </p:sldIdLst>
   <p:sldSz cx="12192000" cy="6858000"/>
   <p:notesSz cx="6858000" cy="9144000"/>
@@ -230,7 +232,7 @@
           <a:p>
             <a:fld id="{CF39A833-E765-7D41-96DE-4BE65F7DBB91}" type="datetimeFigureOut">
               <a:rPr lang="en-US" smtClean="0"/>
-              <a:t>8/26/17</a:t>
+              <a:t>8/29/17</a:t>
             </a:fld>
             <a:endParaRPr lang="en-US"/>
           </a:p>
@@ -626,14 +628,6 @@
           <a:bodyPr/>
           <a:lstStyle/>
           <a:p>
-            <a:r>
-              <a:rPr lang="en-US" dirty="0" smtClean="0"/>
-              <a:t>So why are there outliers</a:t>
-            </a:r>
-            <a:r>
-              <a:rPr lang="en-US" baseline="0" dirty="0" smtClean="0"/>
-              <a:t> in one and not the other?</a:t>
-            </a:r>
             <a:endParaRPr lang="en-US" dirty="0"/>
           </a:p>
         </p:txBody>
@@ -655,7 +649,7 @@
           <a:p>
             <a:fld id="{E32609A5-9C0D-AB4F-B692-674CF9666E27}" type="slidenum">
               <a:rPr lang="en-US" smtClean="0"/>
-              <a:t>28</a:t>
+              <a:t>27</a:t>
             </a:fld>
             <a:endParaRPr lang="en-US"/>
           </a:p>
@@ -664,7 +658,7 @@
     </p:spTree>
     <p:extLst>
       <p:ext uri="{BB962C8B-B14F-4D97-AF65-F5344CB8AC3E}">
-        <p14:creationId xmlns:p14="http://schemas.microsoft.com/office/powerpoint/2010/main" val="1540878455"/>
+        <p14:creationId xmlns:p14="http://schemas.microsoft.com/office/powerpoint/2010/main" val="943746593"/>
       </p:ext>
     </p:extLst>
   </p:cSld>
@@ -720,19 +714,11 @@
           <a:p>
             <a:r>
               <a:rPr lang="en-US" dirty="0" smtClean="0"/>
-              <a:t>Mean vs median,</a:t>
+              <a:t>So why are there outliers</a:t>
             </a:r>
             <a:r>
               <a:rPr lang="en-US" baseline="0" dirty="0" smtClean="0"/>
-              <a:t> symmetric or </a:t>
-            </a:r>
-            <a:r>
-              <a:rPr lang="en-US" baseline="0" dirty="0" err="1" smtClean="0"/>
-              <a:t>asym</a:t>
-            </a:r>
-            <a:r>
-              <a:rPr lang="en-US" baseline="0" dirty="0" smtClean="0"/>
-              <a:t>, is it unimodal?</a:t>
+              <a:t> in one and not the other?</a:t>
             </a:r>
             <a:endParaRPr lang="en-US" dirty="0"/>
           </a:p>
@@ -756,6 +742,106 @@
             <a:fld id="{E32609A5-9C0D-AB4F-B692-674CF9666E27}" type="slidenum">
               <a:rPr lang="en-US" smtClean="0"/>
               <a:t>29</a:t>
+            </a:fld>
+            <a:endParaRPr lang="en-US"/>
+          </a:p>
+        </p:txBody>
+      </p:sp>
+    </p:spTree>
+    <p:extLst>
+      <p:ext uri="{BB962C8B-B14F-4D97-AF65-F5344CB8AC3E}">
+        <p14:creationId xmlns:p14="http://schemas.microsoft.com/office/powerpoint/2010/main" val="1540878455"/>
+      </p:ext>
+    </p:extLst>
+  </p:cSld>
+  <p:clrMapOvr>
+    <a:masterClrMapping/>
+  </p:clrMapOvr>
+</p:notes>
+</file>
+
+<file path=ppt/notesSlides/notesSlide4.xml><?xml version="1.0" encoding="utf-8"?>
+<p:notes xmlns:a="http://schemas.openxmlformats.org/drawingml/2006/main" xmlns:r="http://schemas.openxmlformats.org/officeDocument/2006/relationships" xmlns:p="http://schemas.openxmlformats.org/presentationml/2006/main">
+  <p:cSld>
+    <p:spTree>
+      <p:nvGrpSpPr>
+        <p:cNvPr id="1" name=""/>
+        <p:cNvGrpSpPr/>
+        <p:nvPr/>
+      </p:nvGrpSpPr>
+      <p:grpSpPr>
+        <a:xfrm>
+          <a:off x="0" y="0"/>
+          <a:ext cx="0" cy="0"/>
+          <a:chOff x="0" y="0"/>
+          <a:chExt cx="0" cy="0"/>
+        </a:xfrm>
+      </p:grpSpPr>
+      <p:sp>
+        <p:nvSpPr>
+          <p:cNvPr id="2" name="Slide Image Placeholder 1"/>
+          <p:cNvSpPr>
+            <a:spLocks noGrp="1" noRot="1" noChangeAspect="1"/>
+          </p:cNvSpPr>
+          <p:nvPr>
+            <p:ph type="sldImg"/>
+          </p:nvPr>
+        </p:nvSpPr>
+        <p:spPr/>
+      </p:sp>
+      <p:sp>
+        <p:nvSpPr>
+          <p:cNvPr id="3" name="Notes Placeholder 2"/>
+          <p:cNvSpPr>
+            <a:spLocks noGrp="1"/>
+          </p:cNvSpPr>
+          <p:nvPr>
+            <p:ph type="body" idx="1"/>
+          </p:nvPr>
+        </p:nvSpPr>
+        <p:spPr/>
+        <p:txBody>
+          <a:bodyPr/>
+          <a:lstStyle/>
+          <a:p>
+            <a:r>
+              <a:rPr lang="en-US" dirty="0" smtClean="0"/>
+              <a:t>Mean vs median,</a:t>
+            </a:r>
+            <a:r>
+              <a:rPr lang="en-US" baseline="0" dirty="0" smtClean="0"/>
+              <a:t> symmetric or </a:t>
+            </a:r>
+            <a:r>
+              <a:rPr lang="en-US" baseline="0" dirty="0" err="1" smtClean="0"/>
+              <a:t>asym</a:t>
+            </a:r>
+            <a:r>
+              <a:rPr lang="en-US" baseline="0" dirty="0" smtClean="0"/>
+              <a:t>, is it unimodal?</a:t>
+            </a:r>
+            <a:endParaRPr lang="en-US" dirty="0"/>
+          </a:p>
+        </p:txBody>
+      </p:sp>
+      <p:sp>
+        <p:nvSpPr>
+          <p:cNvPr id="4" name="Slide Number Placeholder 3"/>
+          <p:cNvSpPr>
+            <a:spLocks noGrp="1"/>
+          </p:cNvSpPr>
+          <p:nvPr>
+            <p:ph type="sldNum" sz="quarter" idx="10"/>
+          </p:nvPr>
+        </p:nvSpPr>
+        <p:spPr/>
+        <p:txBody>
+          <a:bodyPr/>
+          <a:lstStyle/>
+          <a:p>
+            <a:fld id="{E32609A5-9C0D-AB4F-B692-674CF9666E27}" type="slidenum">
+              <a:rPr lang="en-US" smtClean="0"/>
+              <a:t>30</a:t>
             </a:fld>
             <a:endParaRPr lang="en-US"/>
           </a:p>
@@ -1000,7 +1086,7 @@
           <a:p>
             <a:fld id="{4BDF68E2-58F2-4D09-BE8B-E3BD06533059}" type="datetimeFigureOut">
               <a:rPr lang="en-US" smtClean="0"/>
-              <a:t>8/26/17</a:t>
+              <a:t>8/29/17</a:t>
             </a:fld>
             <a:endParaRPr lang="en-US" dirty="0"/>
           </a:p>
@@ -1210,7 +1296,7 @@
           <a:p>
             <a:fld id="{2E2D6473-DF6D-4702-B328-E0DD40540A4E}" type="datetimeFigureOut">
               <a:rPr lang="en-US" smtClean="0"/>
-              <a:t>8/26/17</a:t>
+              <a:t>8/29/17</a:t>
             </a:fld>
             <a:endParaRPr lang="en-US" dirty="0"/>
           </a:p>
@@ -1461,7 +1547,7 @@
           <a:p>
             <a:fld id="{E26F7E3A-B166-407D-9866-32884E7D5B37}" type="datetimeFigureOut">
               <a:rPr lang="en-US" smtClean="0"/>
-              <a:t>8/26/17</a:t>
+              <a:t>8/29/17</a:t>
             </a:fld>
             <a:endParaRPr lang="en-US" dirty="0"/>
           </a:p>
@@ -1626,7 +1712,7 @@
           <a:p>
             <a:fld id="{528FC5F6-F338-4AE4-BB23-26385BCFC423}" type="datetimeFigureOut">
               <a:rPr lang="en-US" smtClean="0"/>
-              <a:t>8/26/17</a:t>
+              <a:t>8/29/17</a:t>
             </a:fld>
             <a:endParaRPr lang="en-US" dirty="0"/>
           </a:p>
@@ -1971,7 +2057,7 @@
           <a:p>
             <a:fld id="{20EBB0C4-6273-4C6E-B9BD-2EDC30F1CD52}" type="datetimeFigureOut">
               <a:rPr lang="en-US" smtClean="0"/>
-              <a:t>8/26/17</a:t>
+              <a:t>8/29/17</a:t>
             </a:fld>
             <a:endParaRPr lang="en-US" dirty="0"/>
           </a:p>
@@ -2248,7 +2334,7 @@
           <a:p>
             <a:fld id="{19AB4D41-86C1-4908-B66A-0B50CEB3BF29}" type="datetimeFigureOut">
               <a:rPr lang="en-US" smtClean="0"/>
-              <a:t>8/26/17</a:t>
+              <a:t>8/29/17</a:t>
             </a:fld>
             <a:endParaRPr lang="en-US" dirty="0"/>
           </a:p>
@@ -2629,7 +2715,7 @@
           <a:p>
             <a:fld id="{E6426E2C-56C1-4E0D-A793-0088A7FDD37E}" type="datetimeFigureOut">
               <a:rPr lang="en-US" smtClean="0"/>
-              <a:t>8/26/17</a:t>
+              <a:t>8/29/17</a:t>
             </a:fld>
             <a:endParaRPr lang="en-US" dirty="0"/>
           </a:p>
@@ -2749,7 +2835,7 @@
           <a:p>
             <a:fld id="{C8C39B41-D8B5-4052-B551-9B5525EAA8B6}" type="datetimeFigureOut">
               <a:rPr lang="en-US" smtClean="0"/>
-              <a:t>8/26/17</a:t>
+              <a:t>8/29/17</a:t>
             </a:fld>
             <a:endParaRPr lang="en-US" dirty="0"/>
           </a:p>
@@ -2922,7 +3008,7 @@
           <a:p>
             <a:fld id="{4D94136C-8742-45B2-AF27-D93DF72833A9}" type="datetimeFigureOut">
               <a:rPr lang="en-US" smtClean="0"/>
-              <a:t>8/26/17</a:t>
+              <a:t>8/29/17</a:t>
             </a:fld>
             <a:endParaRPr lang="en-US" dirty="0"/>
           </a:p>
@@ -3279,7 +3365,7 @@
           <a:p>
             <a:fld id="{32ABBEA6-7C60-4B02-AE87-00D78D8422AF}" type="datetimeFigureOut">
               <a:rPr lang="en-US" smtClean="0"/>
-              <a:t>8/26/17</a:t>
+              <a:t>8/29/17</a:t>
             </a:fld>
             <a:endParaRPr lang="en-US" dirty="0"/>
           </a:p>
@@ -3652,7 +3738,7 @@
           <a:p>
             <a:fld id="{C9CAD897-D46E-4AD2-BD9B-49DD3E640873}" type="datetimeFigureOut">
               <a:rPr lang="en-US" smtClean="0"/>
-              <a:t>8/26/17</a:t>
+              <a:t>8/29/17</a:t>
             </a:fld>
             <a:endParaRPr lang="en-US" dirty="0"/>
           </a:p>
@@ -3934,7 +4020,7 @@
           <a:p>
             <a:fld id="{98624D31-43A5-475A-80CF-332C9F6DCF35}" type="datetimeFigureOut">
               <a:rPr lang="en-US" smtClean="0"/>
-              <a:t>8/26/17</a:t>
+              <a:t>8/29/17</a:t>
             </a:fld>
             <a:endParaRPr lang="en-US" dirty="0"/>
           </a:p>
@@ -4517,11 +4603,7 @@
             </a:r>
             <a:r>
               <a:rPr lang="en-US" dirty="0" smtClean="0"/>
-              <a:t> </a:t>
-            </a:r>
-            <a:r>
-              <a:rPr lang="en-US" dirty="0" smtClean="0"/>
-              <a:t>j. </a:t>
+              <a:t> j. </a:t>
             </a:r>
             <a:r>
               <a:rPr lang="en-US" dirty="0" err="1" smtClean="0"/>
@@ -4636,11 +4718,7 @@
             </a:r>
             <a:r>
               <a:rPr lang="en-US" b="1" dirty="0" smtClean="0"/>
-              <a:t>random-number </a:t>
-            </a:r>
-            <a:r>
-              <a:rPr lang="en-US" b="1" dirty="0" smtClean="0"/>
-              <a:t>generator </a:t>
+              <a:t>random-number generator </a:t>
             </a:r>
             <a:r>
               <a:rPr lang="en-US" b="1" dirty="0"/>
@@ -4944,11 +5022,7 @@
             </a:pPr>
             <a:r>
               <a:rPr lang="en-US" b="1" dirty="0" smtClean="0"/>
-              <a:t>Categorical </a:t>
-            </a:r>
-            <a:r>
-              <a:rPr lang="en-US" b="1" dirty="0" smtClean="0"/>
-              <a:t>data</a:t>
+              <a:t>Categorical data</a:t>
             </a:r>
           </a:p>
           <a:p>
@@ -5472,8 +5546,8 @@
           </a:p>
         </p:txBody>
       </p:sp>
-      <mc:AlternateContent xmlns:mc="http://schemas.openxmlformats.org/markup-compatibility/2006">
-        <mc:Choice xmlns:a14="http://schemas.microsoft.com/office/drawing/2010/main" Requires="a14">
+      <mc:AlternateContent xmlns:mc="http://schemas.openxmlformats.org/markup-compatibility/2006" xmlns:a14="http://schemas.microsoft.com/office/drawing/2010/main">
+        <mc:Choice Requires="a14">
           <p:sp>
             <p:nvSpPr>
               <p:cNvPr id="3" name="Content Placeholder 2"/>
@@ -5531,11 +5605,7 @@
                 </a:r>
                 <a:r>
                   <a:rPr lang="en-US" dirty="0" smtClean="0"/>
-                  <a:t>      </a:t>
-                </a:r>
-                <a:r>
-                  <a:rPr lang="en-US" dirty="0" smtClean="0"/>
-                  <a:t> </a:t>
+                  <a:t>       </a:t>
                 </a:r>
                 <a14:m>
                   <m:oMath xmlns:m="http://schemas.openxmlformats.org/officeDocument/2006/math">
@@ -5955,7 +6025,7 @@
             </p:txBody>
           </p:sp>
         </mc:Choice>
-        <mc:Fallback>
+        <mc:Fallback xmlns="">
           <p:sp>
             <p:nvSpPr>
               <p:cNvPr id="3" name="Content Placeholder 2"/>
@@ -6301,7 +6371,14 @@
           <a:p>
             <a:r>
               <a:rPr lang="en-US" dirty="0" smtClean="0"/>
-              <a:t>2, 4, 6, 7, 9, 100, 105, 122, 500 </a:t>
+              <a:t>Difference between largest and smallest value in a distribution</a:t>
+            </a:r>
+          </a:p>
+          <a:p>
+            <a:pPr lvl="1"/>
+            <a:r>
+              <a:rPr lang="en-US" dirty="0" smtClean="0"/>
+              <a:t>1, 2, 3, 7, 9 </a:t>
             </a:r>
             <a:r>
               <a:rPr lang="en-US" dirty="0" smtClean="0">
@@ -6313,8 +6390,32 @@
               <a:rPr lang="en-US" b="1" dirty="0" smtClean="0">
                 <a:sym typeface="Wingdings"/>
               </a:rPr>
-              <a:t>498</a:t>
-            </a:r>
+              <a:t>8</a:t>
+            </a:r>
+            <a:endParaRPr lang="en-US" dirty="0" smtClean="0">
+              <a:sym typeface="Wingdings"/>
+            </a:endParaRPr>
+          </a:p>
+          <a:p>
+            <a:pPr lvl="1"/>
+            <a:r>
+              <a:rPr lang="en-US" dirty="0" smtClean="0">
+                <a:sym typeface="Wingdings"/>
+              </a:rPr>
+              <a:t>1, 2, 3, 7, 9, 500  </a:t>
+            </a:r>
+            <a:r>
+              <a:rPr lang="en-US" b="1" dirty="0" smtClean="0">
+                <a:sym typeface="Wingdings"/>
+              </a:rPr>
+              <a:t>499</a:t>
+            </a:r>
+            <a:endParaRPr lang="en-US" b="1" dirty="0" smtClean="0"/>
+          </a:p>
+          <a:p>
+            <a:endParaRPr lang="en-US" b="1" dirty="0" smtClean="0">
+              <a:sym typeface="Wingdings"/>
+            </a:endParaRPr>
           </a:p>
           <a:p>
             <a:endParaRPr lang="en-US" b="1" dirty="0">
@@ -6326,19 +6427,7 @@
               <a:rPr lang="en-US" dirty="0" smtClean="0">
                 <a:sym typeface="Wingdings"/>
               </a:rPr>
-              <a:t>Not the most fantastic descriptor </a:t>
-            </a:r>
-            <a:r>
-              <a:rPr lang="mr-IN" dirty="0" smtClean="0">
-                <a:sym typeface="Wingdings"/>
-              </a:rPr>
-              <a:t>–</a:t>
-            </a:r>
-            <a:r>
-              <a:rPr lang="en-US" dirty="0" smtClean="0">
-                <a:sym typeface="Wingdings"/>
-              </a:rPr>
-              <a:t> hard to compare distributions with this quantity</a:t>
+              <a:t>Range is very sensitive to extreme observations and becomes very unwieldy very quickly.</a:t>
             </a:r>
             <a:endParaRPr lang="en-US" dirty="0"/>
           </a:p>
@@ -6357,7 +6446,128 @@
   <p:timing>
     <p:tnLst>
       <p:par>
-        <p:cTn id="1" dur="indefinite" restart="never" nodeType="tmRoot"/>
+        <p:cTn id="1" dur="indefinite" restart="never" nodeType="tmRoot">
+          <p:childTnLst>
+            <p:seq concurrent="1" nextAc="seek">
+              <p:cTn id="2" dur="indefinite" nodeType="mainSeq">
+                <p:childTnLst>
+                  <p:par>
+                    <p:cTn id="3" fill="hold">
+                      <p:stCondLst>
+                        <p:cond delay="indefinite"/>
+                      </p:stCondLst>
+                      <p:childTnLst>
+                        <p:par>
+                          <p:cTn id="4" fill="hold">
+                            <p:stCondLst>
+                              <p:cond delay="0"/>
+                            </p:stCondLst>
+                            <p:childTnLst>
+                              <p:par>
+                                <p:cTn id="5" presetID="1" presetClass="entr" presetSubtype="0" fill="hold" nodeType="clickEffect">
+                                  <p:stCondLst>
+                                    <p:cond delay="0"/>
+                                  </p:stCondLst>
+                                  <p:childTnLst>
+                                    <p:set>
+                                      <p:cBhvr>
+                                        <p:cTn id="6" dur="1" fill="hold">
+                                          <p:stCondLst>
+                                            <p:cond delay="0"/>
+                                          </p:stCondLst>
+                                        </p:cTn>
+                                        <p:tgtEl>
+                                          <p:spTgt spid="3">
+                                            <p:txEl>
+                                              <p:pRg st="2" end="2"/>
+                                            </p:txEl>
+                                          </p:spTgt>
+                                        </p:tgtEl>
+                                        <p:attrNameLst>
+                                          <p:attrName>style.visibility</p:attrName>
+                                        </p:attrNameLst>
+                                      </p:cBhvr>
+                                      <p:to>
+                                        <p:strVal val="visible"/>
+                                      </p:to>
+                                    </p:set>
+                                  </p:childTnLst>
+                                </p:cTn>
+                              </p:par>
+                            </p:childTnLst>
+                          </p:cTn>
+                        </p:par>
+                      </p:childTnLst>
+                    </p:cTn>
+                  </p:par>
+                  <p:par>
+                    <p:cTn id="7" fill="hold">
+                      <p:stCondLst>
+                        <p:cond delay="indefinite"/>
+                      </p:stCondLst>
+                      <p:childTnLst>
+                        <p:par>
+                          <p:cTn id="8" fill="hold">
+                            <p:stCondLst>
+                              <p:cond delay="0"/>
+                            </p:stCondLst>
+                            <p:childTnLst>
+                              <p:par>
+                                <p:cTn id="9" presetID="1" presetClass="entr" presetSubtype="0" fill="hold" nodeType="clickEffect">
+                                  <p:stCondLst>
+                                    <p:cond delay="0"/>
+                                  </p:stCondLst>
+                                  <p:childTnLst>
+                                    <p:set>
+                                      <p:cBhvr>
+                                        <p:cTn id="10" dur="1" fill="hold">
+                                          <p:stCondLst>
+                                            <p:cond delay="0"/>
+                                          </p:stCondLst>
+                                        </p:cTn>
+                                        <p:tgtEl>
+                                          <p:spTgt spid="3">
+                                            <p:txEl>
+                                              <p:pRg st="5" end="5"/>
+                                            </p:txEl>
+                                          </p:spTgt>
+                                        </p:tgtEl>
+                                        <p:attrNameLst>
+                                          <p:attrName>style.visibility</p:attrName>
+                                        </p:attrNameLst>
+                                      </p:cBhvr>
+                                      <p:to>
+                                        <p:strVal val="visible"/>
+                                      </p:to>
+                                    </p:set>
+                                  </p:childTnLst>
+                                </p:cTn>
+                              </p:par>
+                            </p:childTnLst>
+                          </p:cTn>
+                        </p:par>
+                      </p:childTnLst>
+                    </p:cTn>
+                  </p:par>
+                </p:childTnLst>
+              </p:cTn>
+              <p:prevCondLst>
+                <p:cond evt="onPrev" delay="0">
+                  <p:tgtEl>
+                    <p:sldTgt/>
+                  </p:tgtEl>
+                </p:cond>
+              </p:prevCondLst>
+              <p:nextCondLst>
+                <p:cond evt="onNext" delay="0">
+                  <p:tgtEl>
+                    <p:sldTgt/>
+                  </p:tgtEl>
+                </p:cond>
+              </p:nextCondLst>
+            </p:seq>
+          </p:childTnLst>
+        </p:cTn>
       </p:par>
     </p:tnLst>
   </p:timing>
@@ -7113,17 +7323,8 @@
           <a:p>
             <a:r>
               <a:rPr lang="en-US" dirty="0" smtClean="0"/>
-              <a:t>Please </a:t>
-            </a:r>
-            <a:r>
-              <a:rPr lang="en-US" dirty="0" smtClean="0"/>
-              <a:t>bring your laptop to class</a:t>
-            </a:r>
-            <a:r>
-              <a:rPr lang="en-US" dirty="0" smtClean="0"/>
-              <a:t>!!!</a:t>
-            </a:r>
-            <a:endParaRPr lang="en-US" dirty="0" smtClean="0"/>
+              <a:t>Please bring your laptop to class!!!</a:t>
+            </a:r>
           </a:p>
           <a:p>
             <a:endParaRPr lang="en-US" dirty="0"/>
@@ -7263,7 +7464,6 @@
               <a:rPr lang="en-US" dirty="0" smtClean="0"/>
               <a:t>”!)</a:t>
             </a:r>
-            <a:endParaRPr lang="en-US" dirty="0" smtClean="0"/>
           </a:p>
           <a:p>
             <a:r>
@@ -7283,23 +7483,7 @@
                   <a:srgbClr val="FF0000"/>
                 </a:solidFill>
               </a:rPr>
-              <a:t>How </a:t>
-            </a:r>
-            <a:r>
-              <a:rPr lang="en-US" dirty="0" smtClean="0">
-                <a:solidFill>
-                  <a:srgbClr val="FF0000"/>
-                </a:solidFill>
-              </a:rPr>
-              <a:t>much of the data does the IQR encompass</a:t>
-            </a:r>
-            <a:r>
-              <a:rPr lang="en-US" dirty="0" smtClean="0">
-                <a:solidFill>
-                  <a:srgbClr val="FF0000"/>
-                </a:solidFill>
-              </a:rPr>
-              <a:t>?</a:t>
+              <a:t>How much of the data does the IQR encompass?</a:t>
             </a:r>
           </a:p>
           <a:p>
@@ -7356,15 +7540,7 @@
                   <a:schemeClr val="tx1"/>
                 </a:solidFill>
               </a:rPr>
-              <a:t>Five </a:t>
-            </a:r>
-            <a:r>
-              <a:rPr lang="en-US" b="1" dirty="0" smtClean="0">
-                <a:solidFill>
-                  <a:schemeClr val="tx1"/>
-                </a:solidFill>
-              </a:rPr>
-              <a:t>number summary:</a:t>
+              <a:t>Five number summary:</a:t>
             </a:r>
             <a:r>
               <a:rPr lang="en-US" dirty="0" smtClean="0">
@@ -7611,7 +7787,6 @@
               <a:rPr lang="en-US" dirty="0" smtClean="0"/>
               <a:t>The median is much more robust to outliers compared to the mean.</a:t>
             </a:r>
-            <a:endParaRPr lang="en-US" dirty="0" smtClean="0"/>
           </a:p>
           <a:p>
             <a:endParaRPr lang="en-US" dirty="0"/>
@@ -7869,8 +8044,8 @@
           </a:p>
         </p:txBody>
       </p:sp>
-      <mc:AlternateContent xmlns:mc="http://schemas.openxmlformats.org/markup-compatibility/2006">
-        <mc:Choice xmlns:a14="http://schemas.microsoft.com/office/drawing/2010/main" Requires="a14">
+      <mc:AlternateContent xmlns:mc="http://schemas.openxmlformats.org/markup-compatibility/2006" xmlns:a14="http://schemas.microsoft.com/office/drawing/2010/main">
+        <mc:Choice Requires="a14">
           <p:sp>
             <p:nvSpPr>
               <p:cNvPr id="3" name="Content Placeholder 2"/>
@@ -7892,23 +8067,7 @@
                 </a:r>
                 <a:r>
                   <a:rPr lang="en-US" dirty="0" smtClean="0"/>
-                  <a:t>is the standard </a:t>
-                </a:r>
-                <a:r>
-                  <a:rPr lang="en-US" dirty="0" smtClean="0"/>
-                  <a:t>deviation of a sample </a:t>
-                </a:r>
-                <a:r>
-                  <a:rPr lang="en-US" dirty="0" smtClean="0"/>
-                  <a:t>expressed as a percentage of </a:t>
-                </a:r>
-                <a:r>
-                  <a:rPr lang="en-US" dirty="0" smtClean="0"/>
-                  <a:t>the sample </a:t>
-                </a:r>
-                <a:r>
-                  <a:rPr lang="en-US" dirty="0" smtClean="0"/>
-                  <a:t>mean (aka normalized)</a:t>
+                  <a:t>is the standard deviation of a sample expressed as a percentage of the sample mean (aka normalized)</a:t>
                 </a:r>
               </a:p>
               <a:p>
@@ -8020,7 +8179,7 @@
             </p:txBody>
           </p:sp>
         </mc:Choice>
-        <mc:Fallback>
+        <mc:Fallback xmlns="">
           <p:sp>
             <p:nvSpPr>
               <p:cNvPr id="3" name="Content Placeholder 2"/>
@@ -8138,8 +8297,8 @@
           </a:p>
         </p:txBody>
       </p:sp>
-      <mc:AlternateContent xmlns:mc="http://schemas.openxmlformats.org/markup-compatibility/2006">
-        <mc:Choice xmlns:a14="http://schemas.microsoft.com/office/drawing/2010/main" Requires="a14">
+      <mc:AlternateContent xmlns:mc="http://schemas.openxmlformats.org/markup-compatibility/2006" xmlns:a14="http://schemas.microsoft.com/office/drawing/2010/main">
+        <mc:Choice Requires="a14">
           <p:graphicFrame>
             <p:nvGraphicFramePr>
               <p:cNvPr id="4" name="Content Placeholder 3"/>
@@ -9112,7 +9271,7 @@
             </a:graphic>
           </p:graphicFrame>
         </mc:Choice>
-        <mc:Fallback>
+        <mc:Fallback xmlns="">
           <p:graphicFrame>
             <p:nvGraphicFramePr>
               <p:cNvPr id="4" name="Content Placeholder 3"/>
@@ -9525,7 +9684,125 @@
             </a:pPr>
             <a:r>
               <a:rPr lang="en-US" dirty="0" smtClean="0"/>
-              <a:t>Histogram and boxplot</a:t>
+              <a:t>Histogram</a:t>
+            </a:r>
+          </a:p>
+          <a:p>
+            <a:pPr marL="335153" lvl="2" indent="0">
+              <a:lnSpc>
+                <a:spcPct val="100000"/>
+              </a:lnSpc>
+              <a:spcBef>
+                <a:spcPts val="0"/>
+              </a:spcBef>
+              <a:spcAft>
+                <a:spcPts val="0"/>
+              </a:spcAft>
+              <a:buClrTx/>
+              <a:buNone/>
+              <a:defRPr/>
+            </a:pPr>
+            <a:r>
+              <a:rPr lang="en-US" dirty="0" smtClean="0"/>
+              <a:t>Density plot</a:t>
+            </a:r>
+          </a:p>
+          <a:p>
+            <a:pPr marL="335153" lvl="2" indent="0">
+              <a:lnSpc>
+                <a:spcPct val="100000"/>
+              </a:lnSpc>
+              <a:spcBef>
+                <a:spcPts val="0"/>
+              </a:spcBef>
+              <a:spcAft>
+                <a:spcPts val="0"/>
+              </a:spcAft>
+              <a:buClrTx/>
+              <a:buNone/>
+              <a:defRPr/>
+            </a:pPr>
+            <a:r>
+              <a:rPr lang="en-US" dirty="0" smtClean="0"/>
+              <a:t>Boxplot</a:t>
+            </a:r>
+            <a:endParaRPr lang="en-US" dirty="0"/>
+          </a:p>
+          <a:p>
+            <a:pPr marL="335153" lvl="2" indent="0">
+              <a:lnSpc>
+                <a:spcPct val="100000"/>
+              </a:lnSpc>
+              <a:spcBef>
+                <a:spcPts val="0"/>
+              </a:spcBef>
+              <a:spcAft>
+                <a:spcPts val="0"/>
+              </a:spcAft>
+              <a:buClrTx/>
+              <a:buNone/>
+              <a:defRPr/>
+            </a:pPr>
+            <a:r>
+              <a:rPr lang="en-US" dirty="0" smtClean="0"/>
+              <a:t>Violin plot</a:t>
+            </a:r>
+          </a:p>
+          <a:p>
+            <a:pPr marL="335153" lvl="2" indent="0">
+              <a:lnSpc>
+                <a:spcPct val="100000"/>
+              </a:lnSpc>
+              <a:spcBef>
+                <a:spcPts val="0"/>
+              </a:spcBef>
+              <a:spcAft>
+                <a:spcPts val="0"/>
+              </a:spcAft>
+              <a:buClrTx/>
+              <a:buNone/>
+              <a:defRPr/>
+            </a:pPr>
+            <a:endParaRPr lang="en-US" dirty="0" smtClean="0"/>
+          </a:p>
+          <a:p>
+            <a:pPr marL="152273" lvl="1" indent="0">
+              <a:lnSpc>
+                <a:spcPct val="100000"/>
+              </a:lnSpc>
+              <a:spcBef>
+                <a:spcPts val="0"/>
+              </a:spcBef>
+              <a:spcAft>
+                <a:spcPts val="0"/>
+              </a:spcAft>
+              <a:buClrTx/>
+              <a:buNone/>
+              <a:defRPr/>
+            </a:pPr>
+            <a:r>
+              <a:rPr lang="en-US" dirty="0" smtClean="0"/>
+              <a:t>Discrete data</a:t>
+            </a:r>
+          </a:p>
+          <a:p>
+            <a:pPr marL="335153" lvl="2" indent="0">
+              <a:lnSpc>
+                <a:spcPct val="100000"/>
+              </a:lnSpc>
+              <a:spcBef>
+                <a:spcPts val="0"/>
+              </a:spcBef>
+              <a:spcAft>
+                <a:spcPts val="0"/>
+              </a:spcAft>
+              <a:buClrTx/>
+              <a:buNone/>
+              <a:defRPr/>
+            </a:pPr>
+            <a:r>
+              <a:rPr lang="en-US" dirty="0" smtClean="0"/>
+              <a:t>Bar plot</a:t>
             </a:r>
           </a:p>
           <a:p>
@@ -9562,11 +9839,7 @@
             </a:pPr>
             <a:r>
               <a:rPr lang="en-US" dirty="0" smtClean="0"/>
-              <a:t>Discrete</a:t>
-            </a:r>
-            <a:r>
-              <a:rPr lang="en-US" dirty="0" smtClean="0"/>
-              <a:t> data</a:t>
+              <a:t>Comparing two continuous variables</a:t>
             </a:r>
           </a:p>
           <a:p>
@@ -9586,7 +9859,7 @@
             </a:pPr>
             <a:r>
               <a:rPr lang="en-US" dirty="0" smtClean="0"/>
-              <a:t>Bar plot</a:t>
+              <a:t>Scatterplot</a:t>
             </a:r>
           </a:p>
           <a:p>
@@ -9623,7 +9896,7 @@
             </a:pPr>
             <a:r>
               <a:rPr lang="en-US" dirty="0" smtClean="0"/>
-              <a:t>Comparing two continuous variables</a:t>
+              <a:t>Trend over time</a:t>
             </a:r>
           </a:p>
           <a:p>
@@ -9643,66 +9916,8 @@
             </a:pPr>
             <a:r>
               <a:rPr lang="en-US" dirty="0" smtClean="0"/>
-              <a:t>Scatterplot</a:t>
-            </a:r>
-          </a:p>
-          <a:p>
-            <a:pPr marL="152273" lvl="1" indent="0">
-              <a:lnSpc>
-                <a:spcPct val="100000"/>
-              </a:lnSpc>
-              <a:spcBef>
-                <a:spcPts val="0"/>
-              </a:spcBef>
-              <a:spcAft>
-                <a:spcPts val="0"/>
-              </a:spcAft>
-              <a:buClrTx/>
-              <a:buNone/>
-              <a:defRPr/>
-            </a:pPr>
-            <a:endParaRPr lang="en-US" dirty="0" smtClean="0"/>
-          </a:p>
-          <a:p>
-            <a:pPr marL="152273" lvl="1" indent="0">
-              <a:lnSpc>
-                <a:spcPct val="100000"/>
-              </a:lnSpc>
-              <a:spcBef>
-                <a:spcPts val="0"/>
-              </a:spcBef>
-              <a:spcAft>
-                <a:spcPts val="0"/>
-              </a:spcAft>
-              <a:buClrTx/>
-              <a:buNone/>
-              <a:defRPr/>
-            </a:pPr>
-            <a:r>
-              <a:rPr lang="en-US" dirty="0" smtClean="0"/>
-              <a:t>Trend over time</a:t>
-            </a:r>
-          </a:p>
-          <a:p>
-            <a:pPr marL="335153" lvl="2" indent="0">
-              <a:lnSpc>
-                <a:spcPct val="100000"/>
-              </a:lnSpc>
-              <a:spcBef>
-                <a:spcPts val="0"/>
-              </a:spcBef>
-              <a:spcAft>
-                <a:spcPts val="0"/>
-              </a:spcAft>
-              <a:buClrTx/>
-              <a:buNone/>
-              <a:defRPr/>
-            </a:pPr>
-            <a:r>
-              <a:rPr lang="en-US" dirty="0" smtClean="0"/>
               <a:t>Line plot</a:t>
             </a:r>
-            <a:endParaRPr lang="en-US" dirty="0" smtClean="0"/>
           </a:p>
         </p:txBody>
       </p:sp>
@@ -9931,6 +10146,250 @@
 </file>
 
 <file path=ppt/slides/slide27.xml><?xml version="1.0" encoding="utf-8"?>
+<p:sld xmlns:a="http://schemas.openxmlformats.org/drawingml/2006/main" xmlns:r="http://schemas.openxmlformats.org/officeDocument/2006/relationships" xmlns:p="http://schemas.openxmlformats.org/presentationml/2006/main">
+  <p:cSld>
+    <p:spTree>
+      <p:nvGrpSpPr>
+        <p:cNvPr id="1" name=""/>
+        <p:cNvGrpSpPr/>
+        <p:nvPr/>
+      </p:nvGrpSpPr>
+      <p:grpSpPr>
+        <a:xfrm>
+          <a:off x="0" y="0"/>
+          <a:ext cx="0" cy="0"/>
+          <a:chOff x="0" y="0"/>
+          <a:chExt cx="0" cy="0"/>
+        </a:xfrm>
+      </p:grpSpPr>
+      <p:sp>
+        <p:nvSpPr>
+          <p:cNvPr id="2" name="Title 1"/>
+          <p:cNvSpPr>
+            <a:spLocks noGrp="1"/>
+          </p:cNvSpPr>
+          <p:nvPr>
+            <p:ph type="title"/>
+          </p:nvPr>
+        </p:nvSpPr>
+        <p:spPr/>
+        <p:txBody>
+          <a:bodyPr/>
+          <a:lstStyle/>
+          <a:p>
+            <a:r>
+              <a:rPr lang="en-US" dirty="0" smtClean="0"/>
+              <a:t>Density plots smoothen histograms</a:t>
+            </a:r>
+            <a:endParaRPr lang="en-US" dirty="0"/>
+          </a:p>
+        </p:txBody>
+      </p:sp>
+      <p:pic>
+        <p:nvPicPr>
+          <p:cNvPr id="4" name="Content Placeholder 3"/>
+          <p:cNvPicPr>
+            <a:picLocks noGrp="1" noChangeAspect="1"/>
+          </p:cNvPicPr>
+          <p:nvPr>
+            <p:ph idx="1"/>
+          </p:nvPr>
+        </p:nvPicPr>
+        <p:blipFill>
+          <a:blip r:embed="rId3">
+            <a:extLst>
+              <a:ext uri="{28A0092B-C50C-407E-A947-70E740481C1C}">
+                <a14:useLocalDpi xmlns:a14="http://schemas.microsoft.com/office/drawing/2010/main" val="0"/>
+              </a:ext>
+            </a:extLst>
+          </a:blip>
+          <a:stretch>
+            <a:fillRect/>
+          </a:stretch>
+        </p:blipFill>
+        <p:spPr>
+          <a:xfrm>
+            <a:off x="1381432" y="2511188"/>
+            <a:ext cx="3357800" cy="3357800"/>
+          </a:xfrm>
+        </p:spPr>
+      </p:pic>
+      <p:pic>
+        <p:nvPicPr>
+          <p:cNvPr id="6" name="Picture 5"/>
+          <p:cNvPicPr>
+            <a:picLocks noChangeAspect="1"/>
+          </p:cNvPicPr>
+          <p:nvPr/>
+        </p:nvPicPr>
+        <p:blipFill>
+          <a:blip r:embed="rId4">
+            <a:extLst>
+              <a:ext uri="{28A0092B-C50C-407E-A947-70E740481C1C}">
+                <a14:useLocalDpi xmlns:a14="http://schemas.microsoft.com/office/drawing/2010/main" val="0"/>
+              </a:ext>
+            </a:extLst>
+          </a:blip>
+          <a:stretch>
+            <a:fillRect/>
+          </a:stretch>
+        </p:blipFill>
+        <p:spPr>
+          <a:xfrm>
+            <a:off x="6745822" y="2513140"/>
+            <a:ext cx="3355848" cy="3355848"/>
+          </a:xfrm>
+          <a:prstGeom prst="rect">
+            <a:avLst/>
+          </a:prstGeom>
+        </p:spPr>
+      </p:pic>
+      <p:pic>
+        <p:nvPicPr>
+          <p:cNvPr id="5" name="Picture 4"/>
+          <p:cNvPicPr>
+            <a:picLocks noChangeAspect="1"/>
+          </p:cNvPicPr>
+          <p:nvPr/>
+        </p:nvPicPr>
+        <p:blipFill>
+          <a:blip r:embed="rId5">
+            <a:extLst>
+              <a:ext uri="{28A0092B-C50C-407E-A947-70E740481C1C}">
+                <a14:useLocalDpi xmlns:a14="http://schemas.microsoft.com/office/drawing/2010/main" val="0"/>
+              </a:ext>
+            </a:extLst>
+          </a:blip>
+          <a:stretch>
+            <a:fillRect/>
+          </a:stretch>
+        </p:blipFill>
+        <p:spPr>
+          <a:xfrm>
+            <a:off x="6707322" y="2513140"/>
+            <a:ext cx="3355848" cy="3355848"/>
+          </a:xfrm>
+          <a:prstGeom prst="rect">
+            <a:avLst/>
+          </a:prstGeom>
+        </p:spPr>
+      </p:pic>
+    </p:spTree>
+    <p:extLst>
+      <p:ext uri="{BB962C8B-B14F-4D97-AF65-F5344CB8AC3E}">
+        <p14:creationId xmlns:p14="http://schemas.microsoft.com/office/powerpoint/2010/main" val="470832102"/>
+      </p:ext>
+    </p:extLst>
+  </p:cSld>
+  <p:clrMapOvr>
+    <a:masterClrMapping/>
+  </p:clrMapOvr>
+  <p:timing>
+    <p:tnLst>
+      <p:par>
+        <p:cTn id="1" dur="indefinite" restart="never" nodeType="tmRoot">
+          <p:childTnLst>
+            <p:seq concurrent="1" nextAc="seek">
+              <p:cTn id="2" dur="indefinite" nodeType="mainSeq">
+                <p:childTnLst>
+                  <p:par>
+                    <p:cTn id="3" fill="hold">
+                      <p:stCondLst>
+                        <p:cond delay="indefinite"/>
+                      </p:stCondLst>
+                      <p:childTnLst>
+                        <p:par>
+                          <p:cTn id="4" fill="hold">
+                            <p:stCondLst>
+                              <p:cond delay="0"/>
+                            </p:stCondLst>
+                            <p:childTnLst>
+                              <p:par>
+                                <p:cTn id="5" presetID="1" presetClass="entr" presetSubtype="0" fill="hold" nodeType="clickEffect">
+                                  <p:stCondLst>
+                                    <p:cond delay="0"/>
+                                  </p:stCondLst>
+                                  <p:childTnLst>
+                                    <p:set>
+                                      <p:cBhvr>
+                                        <p:cTn id="6" dur="1" fill="hold">
+                                          <p:stCondLst>
+                                            <p:cond delay="0"/>
+                                          </p:stCondLst>
+                                        </p:cTn>
+                                        <p:tgtEl>
+                                          <p:spTgt spid="6"/>
+                                        </p:tgtEl>
+                                        <p:attrNameLst>
+                                          <p:attrName>style.visibility</p:attrName>
+                                        </p:attrNameLst>
+                                      </p:cBhvr>
+                                      <p:to>
+                                        <p:strVal val="visible"/>
+                                      </p:to>
+                                    </p:set>
+                                  </p:childTnLst>
+                                </p:cTn>
+                              </p:par>
+                              <p:par>
+                                <p:cTn id="7" presetID="1" presetClass="entr" presetSubtype="0" fill="hold" nodeType="withEffect">
+                                  <p:stCondLst>
+                                    <p:cond delay="0"/>
+                                  </p:stCondLst>
+                                  <p:childTnLst>
+                                    <p:set>
+                                      <p:cBhvr>
+                                        <p:cTn id="8" dur="1" fill="hold">
+                                          <p:stCondLst>
+                                            <p:cond delay="0"/>
+                                          </p:stCondLst>
+                                        </p:cTn>
+                                        <p:tgtEl>
+                                          <p:spTgt spid="5"/>
+                                        </p:tgtEl>
+                                        <p:attrNameLst>
+                                          <p:attrName>style.visibility</p:attrName>
+                                        </p:attrNameLst>
+                                      </p:cBhvr>
+                                      <p:to>
+                                        <p:strVal val="visible"/>
+                                      </p:to>
+                                    </p:set>
+                                  </p:childTnLst>
+                                </p:cTn>
+                              </p:par>
+                            </p:childTnLst>
+                          </p:cTn>
+                        </p:par>
+                      </p:childTnLst>
+                    </p:cTn>
+                  </p:par>
+                </p:childTnLst>
+              </p:cTn>
+              <p:prevCondLst>
+                <p:cond evt="onPrev" delay="0">
+                  <p:tgtEl>
+                    <p:sldTgt/>
+                  </p:tgtEl>
+                </p:cond>
+              </p:prevCondLst>
+              <p:nextCondLst>
+                <p:cond evt="onNext" delay="0">
+                  <p:tgtEl>
+                    <p:sldTgt/>
+                  </p:tgtEl>
+                </p:cond>
+              </p:nextCondLst>
+            </p:seq>
+          </p:childTnLst>
+        </p:cTn>
+      </p:par>
+    </p:tnLst>
+  </p:timing>
+</p:sld>
+</file>
+
+<file path=ppt/slides/slide28.xml><?xml version="1.0" encoding="utf-8"?>
 <p:sld xmlns:a="http://schemas.openxmlformats.org/drawingml/2006/main" xmlns:r="http://schemas.openxmlformats.org/officeDocument/2006/relationships" xmlns:p="http://schemas.openxmlformats.org/presentationml/2006/main">
   <p:cSld>
     <p:spTree>
@@ -10524,6 +10983,36 @@
           </a:p>
         </p:txBody>
       </p:sp>
+      <p:pic>
+        <p:nvPicPr>
+          <p:cNvPr id="5" name="Picture 4"/>
+          <p:cNvPicPr>
+            <a:picLocks noChangeAspect="1"/>
+          </p:cNvPicPr>
+          <p:nvPr/>
+        </p:nvPicPr>
+        <p:blipFill>
+          <a:blip r:embed="rId3">
+            <a:extLst>
+              <a:ext uri="{28A0092B-C50C-407E-A947-70E740481C1C}">
+                <a14:useLocalDpi xmlns:a14="http://schemas.microsoft.com/office/drawing/2010/main" val="0"/>
+              </a:ext>
+            </a:extLst>
+          </a:blip>
+          <a:stretch>
+            <a:fillRect/>
+          </a:stretch>
+        </p:blipFill>
+        <p:spPr>
+          <a:xfrm>
+            <a:off x="1204790" y="3823029"/>
+            <a:ext cx="4691663" cy="2154439"/>
+          </a:xfrm>
+          <a:prstGeom prst="rect">
+            <a:avLst/>
+          </a:prstGeom>
+        </p:spPr>
+      </p:pic>
     </p:spTree>
     <p:extLst>
       <p:ext uri="{BB962C8B-B14F-4D97-AF65-F5344CB8AC3E}">
@@ -10946,7 +11435,7 @@
                             </p:stCondLst>
                             <p:childTnLst>
                               <p:par>
-                                <p:cTn id="35" presetID="1" presetClass="entr" presetSubtype="0" fill="hold" nodeType="clickEffect">
+                                <p:cTn id="35" presetID="1" presetClass="entr" presetSubtype="0" fill="hold" grpId="1" nodeType="clickEffect">
                                   <p:stCondLst>
                                     <p:cond delay="0"/>
                                   </p:stCondLst>
@@ -10964,6 +11453,33 @@
                                               <p:pRg st="2" end="2"/>
                                             </p:txEl>
                                           </p:spTgt>
+                                        </p:tgtEl>
+                                        <p:attrNameLst>
+                                          <p:attrName>style.visibility</p:attrName>
+                                        </p:attrNameLst>
+                                      </p:cBhvr>
+                                      <p:to>
+                                        <p:strVal val="visible"/>
+                                      </p:to>
+                                    </p:set>
+                                  </p:childTnLst>
+                                </p:cTn>
+                              </p:par>
+                              <p:par>
+                                <p:cTn id="37" presetID="1" presetClass="entr" presetSubtype="0" fill="hold" nodeType="withEffect">
+                                  <p:stCondLst>
+                                    <p:cond delay="0"/>
+                                  </p:stCondLst>
+                                  <p:childTnLst>
+                                    <p:set>
+                                      <p:cBhvr>
+                                        <p:cTn id="38" dur="1" fill="hold">
+                                          <p:stCondLst>
+                                            <p:cond delay="0"/>
+                                          </p:stCondLst>
+                                        </p:cTn>
+                                        <p:tgtEl>
+                                          <p:spTgt spid="5"/>
                                         </p:tgtEl>
                                         <p:attrNameLst>
                                           <p:attrName>style.visibility</p:attrName>
@@ -11005,6 +11521,7 @@
     </p:tnLst>
     <p:bldLst>
       <p:bldP spid="3" grpId="0" uiExpand="1" build="p"/>
+      <p:bldP spid="3" grpId="1" uiExpand="1" build="p"/>
       <p:bldP spid="6" grpId="0" animBg="1"/>
       <p:bldP spid="9" grpId="0" animBg="1"/>
       <p:bldP spid="11" grpId="0"/>
@@ -11020,7 +11537,7 @@
 </p:sld>
 </file>
 
-<file path=ppt/slides/slide28.xml><?xml version="1.0" encoding="utf-8"?>
+<file path=ppt/slides/slide29.xml><?xml version="1.0" encoding="utf-8"?>
 <p:sld xmlns:a="http://schemas.openxmlformats.org/drawingml/2006/main" xmlns:r="http://schemas.openxmlformats.org/officeDocument/2006/relationships" xmlns:p="http://schemas.openxmlformats.org/presentationml/2006/main">
   <p:cSld>
     <p:spTree>
@@ -11312,7 +11829,185 @@
 </p:sld>
 </file>
 
-<file path=ppt/slides/slide29.xml><?xml version="1.0" encoding="utf-8"?>
+<file path=ppt/slides/slide3.xml><?xml version="1.0" encoding="utf-8"?>
+<p:sld xmlns:a="http://schemas.openxmlformats.org/drawingml/2006/main" xmlns:r="http://schemas.openxmlformats.org/officeDocument/2006/relationships" xmlns:p="http://schemas.openxmlformats.org/presentationml/2006/main">
+  <p:cSld>
+    <p:spTree>
+      <p:nvGrpSpPr>
+        <p:cNvPr id="1" name=""/>
+        <p:cNvGrpSpPr/>
+        <p:nvPr/>
+      </p:nvGrpSpPr>
+      <p:grpSpPr>
+        <a:xfrm>
+          <a:off x="0" y="0"/>
+          <a:ext cx="0" cy="0"/>
+          <a:chOff x="0" y="0"/>
+          <a:chExt cx="0" cy="0"/>
+        </a:xfrm>
+      </p:grpSpPr>
+      <p:sp>
+        <p:nvSpPr>
+          <p:cNvPr id="2" name="Title 1"/>
+          <p:cNvSpPr>
+            <a:spLocks noGrp="1"/>
+          </p:cNvSpPr>
+          <p:nvPr>
+            <p:ph type="title"/>
+          </p:nvPr>
+        </p:nvSpPr>
+        <p:spPr/>
+        <p:txBody>
+          <a:bodyPr/>
+          <a:lstStyle/>
+          <a:p>
+            <a:r>
+              <a:rPr lang="en-US" dirty="0" smtClean="0"/>
+              <a:t>Course goals</a:t>
+            </a:r>
+            <a:endParaRPr lang="en-US" dirty="0"/>
+          </a:p>
+        </p:txBody>
+      </p:sp>
+      <p:sp>
+        <p:nvSpPr>
+          <p:cNvPr id="3" name="Content Placeholder 2"/>
+          <p:cNvSpPr>
+            <a:spLocks noGrp="1"/>
+          </p:cNvSpPr>
+          <p:nvPr>
+            <p:ph idx="1"/>
+          </p:nvPr>
+        </p:nvSpPr>
+        <p:spPr/>
+        <p:txBody>
+          <a:bodyPr/>
+          <a:lstStyle/>
+          <a:p>
+            <a:r>
+              <a:rPr lang="en-US" dirty="0" smtClean="0"/>
+              <a:t>The primary goal is to </a:t>
+            </a:r>
+            <a:r>
+              <a:rPr lang="en-US" b="1" dirty="0" smtClean="0"/>
+              <a:t>analyze, interpret, and visualize </a:t>
+            </a:r>
+            <a:r>
+              <a:rPr lang="en-US" dirty="0" smtClean="0"/>
+              <a:t>data in the biological sciences</a:t>
+            </a:r>
+          </a:p>
+          <a:p>
+            <a:r>
+              <a:rPr lang="en-US" dirty="0" smtClean="0"/>
+              <a:t>Achieved via statistical analysis and data science techniques in R</a:t>
+            </a:r>
+          </a:p>
+          <a:p>
+            <a:endParaRPr lang="en-US" dirty="0"/>
+          </a:p>
+          <a:p>
+            <a:pPr algn="ctr"/>
+            <a:r>
+              <a:rPr lang="en-US" b="1" dirty="0" smtClean="0"/>
+              <a:t>This is not a course in statistical theory. </a:t>
+            </a:r>
+          </a:p>
+        </p:txBody>
+      </p:sp>
+    </p:spTree>
+    <p:extLst>
+      <p:ext uri="{BB962C8B-B14F-4D97-AF65-F5344CB8AC3E}">
+        <p14:creationId xmlns:p14="http://schemas.microsoft.com/office/powerpoint/2010/main" val="1723505302"/>
+      </p:ext>
+    </p:extLst>
+  </p:cSld>
+  <p:clrMapOvr>
+    <a:masterClrMapping/>
+  </p:clrMapOvr>
+  <p:timing>
+    <p:tnLst>
+      <p:par>
+        <p:cTn id="1" dur="indefinite" restart="never" nodeType="tmRoot">
+          <p:childTnLst>
+            <p:seq concurrent="1" nextAc="seek">
+              <p:cTn id="2" dur="indefinite" nodeType="mainSeq">
+                <p:childTnLst>
+                  <p:par>
+                    <p:cTn id="3" fill="hold">
+                      <p:stCondLst>
+                        <p:cond delay="indefinite"/>
+                      </p:stCondLst>
+                      <p:childTnLst>
+                        <p:par>
+                          <p:cTn id="4" fill="hold">
+                            <p:stCondLst>
+                              <p:cond delay="0"/>
+                            </p:stCondLst>
+                            <p:childTnLst>
+                              <p:par>
+                                <p:cTn id="5" presetID="1" presetClass="entr" presetSubtype="0" fill="hold" nodeType="clickEffect">
+                                  <p:stCondLst>
+                                    <p:cond delay="0"/>
+                                  </p:stCondLst>
+                                  <p:childTnLst>
+                                    <p:set>
+                                      <p:cBhvr>
+                                        <p:cTn id="6" dur="1" fill="hold">
+                                          <p:stCondLst>
+                                            <p:cond delay="0"/>
+                                          </p:stCondLst>
+                                        </p:cTn>
+                                        <p:tgtEl>
+                                          <p:spTgt spid="3">
+                                            <p:txEl>
+                                              <p:pRg st="3" end="3"/>
+                                            </p:txEl>
+                                          </p:spTgt>
+                                        </p:tgtEl>
+                                        <p:attrNameLst>
+                                          <p:attrName>style.visibility</p:attrName>
+                                        </p:attrNameLst>
+                                      </p:cBhvr>
+                                      <p:to>
+                                        <p:strVal val="visible"/>
+                                      </p:to>
+                                    </p:set>
+                                  </p:childTnLst>
+                                </p:cTn>
+                              </p:par>
+                            </p:childTnLst>
+                          </p:cTn>
+                        </p:par>
+                      </p:childTnLst>
+                    </p:cTn>
+                  </p:par>
+                </p:childTnLst>
+              </p:cTn>
+              <p:prevCondLst>
+                <p:cond evt="onPrev" delay="0">
+                  <p:tgtEl>
+                    <p:sldTgt/>
+                  </p:tgtEl>
+                </p:cond>
+              </p:prevCondLst>
+              <p:nextCondLst>
+                <p:cond evt="onNext" delay="0">
+                  <p:tgtEl>
+                    <p:sldTgt/>
+                  </p:tgtEl>
+                </p:cond>
+              </p:nextCondLst>
+            </p:seq>
+          </p:childTnLst>
+        </p:cTn>
+      </p:par>
+    </p:tnLst>
+  </p:timing>
+</p:sld>
+</file>
+
+<file path=ppt/slides/slide30.xml><?xml version="1.0" encoding="utf-8"?>
 <p:sld xmlns:a="http://schemas.openxmlformats.org/drawingml/2006/main" xmlns:r="http://schemas.openxmlformats.org/officeDocument/2006/relationships" xmlns:p="http://schemas.openxmlformats.org/presentationml/2006/main">
   <p:cSld>
     <p:spTree>
@@ -11677,7 +12372,7 @@
 </p:sld>
 </file>
 
-<file path=ppt/slides/slide3.xml><?xml version="1.0" encoding="utf-8"?>
+<file path=ppt/slides/slide31.xml><?xml version="1.0" encoding="utf-8"?>
 <p:sld xmlns:a="http://schemas.openxmlformats.org/drawingml/2006/main" xmlns:r="http://schemas.openxmlformats.org/officeDocument/2006/relationships" xmlns:p="http://schemas.openxmlformats.org/presentationml/2006/main">
   <p:cSld>
     <p:spTree>
@@ -11711,66 +12406,225 @@
           <a:p>
             <a:r>
               <a:rPr lang="en-US" dirty="0" smtClean="0"/>
-              <a:t>Course goals</a:t>
+              <a:t>Violin plot: Density meets boxplot</a:t>
             </a:r>
             <a:endParaRPr lang="en-US" dirty="0"/>
           </a:p>
         </p:txBody>
       </p:sp>
-      <p:sp>
-        <p:nvSpPr>
-          <p:cNvPr id="3" name="Content Placeholder 2"/>
-          <p:cNvSpPr>
-            <a:spLocks noGrp="1"/>
-          </p:cNvSpPr>
+      <p:pic>
+        <p:nvPicPr>
+          <p:cNvPr id="8" name="Content Placeholder 7"/>
+          <p:cNvPicPr>
+            <a:picLocks noGrp="1" noChangeAspect="1"/>
+          </p:cNvPicPr>
           <p:nvPr>
             <p:ph idx="1"/>
           </p:nvPr>
-        </p:nvSpPr>
-        <p:spPr/>
-        <p:txBody>
-          <a:bodyPr/>
+        </p:nvPicPr>
+        <p:blipFill>
+          <a:blip r:embed="rId2">
+            <a:extLst>
+              <a:ext uri="{28A0092B-C50C-407E-A947-70E740481C1C}">
+                <a14:useLocalDpi xmlns:a14="http://schemas.microsoft.com/office/drawing/2010/main" val="0"/>
+              </a:ext>
+            </a:extLst>
+          </a:blip>
+          <a:stretch>
+            <a:fillRect/>
+          </a:stretch>
+        </p:blipFill>
+        <p:spPr>
+          <a:xfrm>
+            <a:off x="3916076" y="2358189"/>
+            <a:ext cx="4420807" cy="4022725"/>
+          </a:xfrm>
+        </p:spPr>
+      </p:pic>
+      <p:sp>
+        <p:nvSpPr>
+          <p:cNvPr id="10" name="TextBox 9"/>
+          <p:cNvSpPr txBox="1"/>
+          <p:nvPr/>
+        </p:nvSpPr>
+        <p:spPr>
+          <a:xfrm>
+            <a:off x="8441355" y="2608446"/>
+            <a:ext cx="1549668" cy="369332"/>
+          </a:xfrm>
+          <a:prstGeom prst="rect">
+            <a:avLst/>
+          </a:prstGeom>
+          <a:noFill/>
+        </p:spPr>
+        <p:txBody>
+          <a:bodyPr wrap="square" rtlCol="0">
+            <a:spAutoFit/>
+          </a:bodyPr>
           <a:lstStyle/>
           <a:p>
             <a:r>
               <a:rPr lang="en-US" dirty="0" smtClean="0"/>
-              <a:t>The primary goal is to </a:t>
-            </a:r>
-            <a:r>
-              <a:rPr lang="en-US" b="1" dirty="0" smtClean="0"/>
-              <a:t>analyze, interpret, and visualize </a:t>
-            </a:r>
+              <a:t>Violin plot</a:t>
+            </a:r>
+            <a:endParaRPr lang="en-US" dirty="0"/>
+          </a:p>
+        </p:txBody>
+      </p:sp>
+      <p:sp>
+        <p:nvSpPr>
+          <p:cNvPr id="11" name="TextBox 10"/>
+          <p:cNvSpPr txBox="1"/>
+          <p:nvPr/>
+        </p:nvSpPr>
+        <p:spPr>
+          <a:xfrm>
+            <a:off x="8441355" y="3848864"/>
+            <a:ext cx="1549668" cy="369332"/>
+          </a:xfrm>
+          <a:prstGeom prst="rect">
+            <a:avLst/>
+          </a:prstGeom>
+          <a:noFill/>
+        </p:spPr>
+        <p:txBody>
+          <a:bodyPr wrap="square" rtlCol="0">
+            <a:spAutoFit/>
+          </a:bodyPr>
+          <a:lstStyle/>
+          <a:p>
             <a:r>
               <a:rPr lang="en-US" dirty="0" smtClean="0"/>
-              <a:t>data in the biological sciences</a:t>
-            </a:r>
-          </a:p>
+              <a:t>Density plot</a:t>
+            </a:r>
+            <a:endParaRPr lang="en-US" dirty="0"/>
+          </a:p>
+        </p:txBody>
+      </p:sp>
+      <p:sp>
+        <p:nvSpPr>
+          <p:cNvPr id="12" name="TextBox 11"/>
+          <p:cNvSpPr txBox="1"/>
+          <p:nvPr/>
+        </p:nvSpPr>
+        <p:spPr>
+          <a:xfrm>
+            <a:off x="8441355" y="5089282"/>
+            <a:ext cx="1549668" cy="369332"/>
+          </a:xfrm>
+          <a:prstGeom prst="rect">
+            <a:avLst/>
+          </a:prstGeom>
+          <a:noFill/>
+        </p:spPr>
+        <p:txBody>
+          <a:bodyPr wrap="square" rtlCol="0">
+            <a:spAutoFit/>
+          </a:bodyPr>
+          <a:lstStyle/>
           <a:p>
             <a:r>
               <a:rPr lang="en-US" dirty="0" smtClean="0"/>
-              <a:t>Achieved via statistical analysis and data science techniques in </a:t>
-            </a:r>
+              <a:t>Boxplot </a:t>
+            </a:r>
+            <a:endParaRPr lang="en-US" dirty="0"/>
+          </a:p>
+        </p:txBody>
+      </p:sp>
+      <p:sp>
+        <p:nvSpPr>
+          <p:cNvPr id="13" name="TextBox 12"/>
+          <p:cNvSpPr txBox="1"/>
+          <p:nvPr/>
+        </p:nvSpPr>
+        <p:spPr>
+          <a:xfrm>
+            <a:off x="4523874" y="1988237"/>
+            <a:ext cx="972152" cy="369332"/>
+          </a:xfrm>
+          <a:prstGeom prst="rect">
+            <a:avLst/>
+          </a:prstGeom>
+          <a:noFill/>
+        </p:spPr>
+        <p:txBody>
+          <a:bodyPr wrap="square" rtlCol="0">
+            <a:spAutoFit/>
+          </a:bodyPr>
+          <a:lstStyle/>
+          <a:p>
+            <a:r>
+              <a:rPr lang="en-US" smtClean="0"/>
+              <a:t>N(5, 4)</a:t>
+            </a:r>
+            <a:endParaRPr lang="en-US"/>
+          </a:p>
+        </p:txBody>
+      </p:sp>
+      <p:sp>
+        <p:nvSpPr>
+          <p:cNvPr id="14" name="TextBox 13"/>
+          <p:cNvSpPr txBox="1"/>
+          <p:nvPr/>
+        </p:nvSpPr>
+        <p:spPr>
+          <a:xfrm>
+            <a:off x="5944302" y="1988237"/>
+            <a:ext cx="972152" cy="369332"/>
+          </a:xfrm>
+          <a:prstGeom prst="rect">
+            <a:avLst/>
+          </a:prstGeom>
+          <a:noFill/>
+        </p:spPr>
+        <p:txBody>
+          <a:bodyPr wrap="square" rtlCol="0">
+            <a:spAutoFit/>
+          </a:bodyPr>
+          <a:lstStyle/>
+          <a:p>
             <a:r>
               <a:rPr lang="en-US" dirty="0" smtClean="0"/>
-              <a:t>R</a:t>
-            </a:r>
-          </a:p>
-          <a:p>
+              <a:t>N(2, 1)</a:t>
+            </a:r>
             <a:endParaRPr lang="en-US" dirty="0"/>
           </a:p>
-          <a:p>
-            <a:pPr algn="ctr"/>
-            <a:r>
-              <a:rPr lang="en-US" b="1" dirty="0" smtClean="0"/>
-              <a:t>This is not a course in statistical theory. </a:t>
-            </a:r>
+        </p:txBody>
+      </p:sp>
+      <p:sp>
+        <p:nvSpPr>
+          <p:cNvPr id="15" name="TextBox 14"/>
+          <p:cNvSpPr txBox="1"/>
+          <p:nvPr/>
+        </p:nvSpPr>
+        <p:spPr>
+          <a:xfrm>
+            <a:off x="7150217" y="1988237"/>
+            <a:ext cx="1291137" cy="369332"/>
+          </a:xfrm>
+          <a:prstGeom prst="rect">
+            <a:avLst/>
+          </a:prstGeom>
+          <a:noFill/>
+        </p:spPr>
+        <p:txBody>
+          <a:bodyPr wrap="square" rtlCol="0">
+            <a:spAutoFit/>
+          </a:bodyPr>
+          <a:lstStyle/>
+          <a:p>
+            <a:r>
+              <a:rPr lang="en-US" smtClean="0"/>
+              <a:t>N(4, 0.09)</a:t>
+            </a:r>
+            <a:endParaRPr lang="en-US"/>
           </a:p>
         </p:txBody>
       </p:sp>
     </p:spTree>
     <p:extLst>
       <p:ext uri="{BB962C8B-B14F-4D97-AF65-F5344CB8AC3E}">
-        <p14:creationId xmlns:p14="http://schemas.microsoft.com/office/powerpoint/2010/main" val="1723505302"/>
+        <p14:creationId xmlns:p14="http://schemas.microsoft.com/office/powerpoint/2010/main" val="1542548063"/>
       </p:ext>
     </p:extLst>
   </p:cSld>
@@ -11780,86 +12634,14 @@
   <p:timing>
     <p:tnLst>
       <p:par>
-        <p:cTn id="1" dur="indefinite" restart="never" nodeType="tmRoot">
-          <p:childTnLst>
-            <p:seq concurrent="1" nextAc="seek">
-              <p:cTn id="2" dur="indefinite" nodeType="mainSeq">
-                <p:childTnLst>
-                  <p:par>
-                    <p:cTn id="3" fill="hold">
-                      <p:stCondLst>
-                        <p:cond delay="indefinite"/>
-                      </p:stCondLst>
-                      <p:childTnLst>
-                        <p:par>
-                          <p:cTn id="4" fill="hold">
-                            <p:stCondLst>
-                              <p:cond delay="0"/>
-                            </p:stCondLst>
-                            <p:childTnLst>
-                              <p:par>
-                                <p:cTn id="5" presetID="1" presetClass="entr" presetSubtype="0" fill="hold" nodeType="clickEffect">
-                                  <p:stCondLst>
-                                    <p:cond delay="0"/>
-                                  </p:stCondLst>
-                                  <p:childTnLst>
-                                    <p:set>
-                                      <p:cBhvr>
-                                        <p:cTn id="6" dur="1" fill="hold">
-                                          <p:stCondLst>
-                                            <p:cond delay="0"/>
-                                          </p:stCondLst>
-                                        </p:cTn>
-                                        <p:tgtEl>
-                                          <p:spTgt spid="3">
-                                            <p:txEl>
-                                              <p:pRg st="3" end="3"/>
-                                            </p:txEl>
-                                          </p:spTgt>
-                                        </p:tgtEl>
-                                        <p:attrNameLst>
-                                          <p:attrName>style.visibility</p:attrName>
-                                        </p:attrNameLst>
-                                      </p:cBhvr>
-                                      <p:to>
-                                        <p:strVal val="visible"/>
-                                      </p:to>
-                                    </p:set>
-                                  </p:childTnLst>
-                                </p:cTn>
-                              </p:par>
-                            </p:childTnLst>
-                          </p:cTn>
-                        </p:par>
-                      </p:childTnLst>
-                    </p:cTn>
-                  </p:par>
-                </p:childTnLst>
-              </p:cTn>
-              <p:prevCondLst>
-                <p:cond evt="onPrev" delay="0">
-                  <p:tgtEl>
-                    <p:sldTgt/>
-                  </p:tgtEl>
-                </p:cond>
-              </p:prevCondLst>
-              <p:nextCondLst>
-                <p:cond evt="onNext" delay="0">
-                  <p:tgtEl>
-                    <p:sldTgt/>
-                  </p:tgtEl>
-                </p:cond>
-              </p:nextCondLst>
-            </p:seq>
-          </p:childTnLst>
-        </p:cTn>
+        <p:cTn id="1" dur="indefinite" restart="never" nodeType="tmRoot"/>
       </p:par>
     </p:tnLst>
   </p:timing>
 </p:sld>
 </file>
 
-<file path=ppt/slides/slide30.xml><?xml version="1.0" encoding="utf-8"?>
+<file path=ppt/slides/slide32.xml><?xml version="1.0" encoding="utf-8"?>
 <p:sld xmlns:a="http://schemas.openxmlformats.org/drawingml/2006/main" xmlns:r="http://schemas.openxmlformats.org/officeDocument/2006/relationships" xmlns:p="http://schemas.openxmlformats.org/presentationml/2006/main">
   <p:cSld>
     <p:spTree>
@@ -11948,7 +12730,7 @@
 </p:sld>
 </file>
 
-<file path=ppt/slides/slide31.xml><?xml version="1.0" encoding="utf-8"?>
+<file path=ppt/slides/slide33.xml><?xml version="1.0" encoding="utf-8"?>
 <p:sld xmlns:a="http://schemas.openxmlformats.org/drawingml/2006/main" xmlns:r="http://schemas.openxmlformats.org/officeDocument/2006/relationships" xmlns:p="http://schemas.openxmlformats.org/presentationml/2006/main">
   <p:cSld>
     <p:spTree>
@@ -12075,7 +12857,7 @@
 </p:sld>
 </file>
 
-<file path=ppt/slides/slide32.xml><?xml version="1.0" encoding="utf-8"?>
+<file path=ppt/slides/slide34.xml><?xml version="1.0" encoding="utf-8"?>
 <p:sld xmlns:a="http://schemas.openxmlformats.org/drawingml/2006/main" xmlns:r="http://schemas.openxmlformats.org/officeDocument/2006/relationships" xmlns:p="http://schemas.openxmlformats.org/presentationml/2006/main">
   <p:cSld>
     <p:spTree>
@@ -12517,7 +13299,7 @@
 </p:sld>
 </file>
 
-<file path=ppt/slides/slide33.xml><?xml version="1.0" encoding="utf-8"?>
+<file path=ppt/slides/slide35.xml><?xml version="1.0" encoding="utf-8"?>
 <p:sld xmlns:a="http://schemas.openxmlformats.org/drawingml/2006/main" xmlns:r="http://schemas.openxmlformats.org/officeDocument/2006/relationships" xmlns:p="http://schemas.openxmlformats.org/presentationml/2006/main">
   <p:cSld>
     <p:spTree>
@@ -12704,7 +13486,7 @@
 </p:sld>
 </file>
 
-<file path=ppt/slides/slide34.xml><?xml version="1.0" encoding="utf-8"?>
+<file path=ppt/slides/slide36.xml><?xml version="1.0" encoding="utf-8"?>
 <p:sld xmlns:a="http://schemas.openxmlformats.org/drawingml/2006/main" xmlns:r="http://schemas.openxmlformats.org/officeDocument/2006/relationships" xmlns:p="http://schemas.openxmlformats.org/presentationml/2006/main">
   <p:cSld>
     <p:spTree>
@@ -13139,11 +13921,7 @@
             </a:r>
             <a:r>
               <a:rPr lang="en-US" b="1" dirty="0" smtClean="0"/>
-              <a:t>quantify uncertainty of </a:t>
-            </a:r>
-            <a:r>
-              <a:rPr lang="en-US" b="1" dirty="0" smtClean="0"/>
-              <a:t>data</a:t>
+              <a:t>quantify uncertainty of data</a:t>
             </a:r>
           </a:p>
           <a:p>

</xml_diff>